<commit_message>
New asset to explain what is a BoundBox
</commit_message>
<xml_diff>
--- a/assets/inheritance-flatening-schema.pptx
+++ b/assets/inheritance-flatening-schema.pptx
@@ -6,6 +6,7 @@
   </p:sldMasterIdLst>
   <p:sldIdLst>
     <p:sldId id="256" r:id="rId2"/>
+    <p:sldId id="257" r:id="rId3"/>
   </p:sldIdLst>
   <p:sldSz cx="9144000" cy="6858000" type="screen4x3"/>
   <p:notesSz cx="6858000" cy="9144000"/>
@@ -285,7 +286,7 @@
           <a:lstStyle/>
           <a:p>
             <a:fld id="{7B1C6575-2C33-C647-A206-42517C0356B4}" type="datetimeFigureOut">
-              <a:t>12/09/13</a:t>
+              <a:t>15/09/13</a:t>
             </a:fld>
             <a:endParaRPr lang="fr-FR"/>
           </a:p>
@@ -451,7 +452,7 @@
           <a:lstStyle/>
           <a:p>
             <a:fld id="{7B1C6575-2C33-C647-A206-42517C0356B4}" type="datetimeFigureOut">
-              <a:t>12/09/13</a:t>
+              <a:t>15/09/13</a:t>
             </a:fld>
             <a:endParaRPr lang="fr-FR"/>
           </a:p>
@@ -627,7 +628,7 @@
           <a:lstStyle/>
           <a:p>
             <a:fld id="{7B1C6575-2C33-C647-A206-42517C0356B4}" type="datetimeFigureOut">
-              <a:t>12/09/13</a:t>
+              <a:t>15/09/13</a:t>
             </a:fld>
             <a:endParaRPr lang="fr-FR"/>
           </a:p>
@@ -793,7 +794,7 @@
           <a:lstStyle/>
           <a:p>
             <a:fld id="{7B1C6575-2C33-C647-A206-42517C0356B4}" type="datetimeFigureOut">
-              <a:t>12/09/13</a:t>
+              <a:t>15/09/13</a:t>
             </a:fld>
             <a:endParaRPr lang="fr-FR"/>
           </a:p>
@@ -1036,7 +1037,7 @@
           <a:lstStyle/>
           <a:p>
             <a:fld id="{7B1C6575-2C33-C647-A206-42517C0356B4}" type="datetimeFigureOut">
-              <a:t>12/09/13</a:t>
+              <a:t>15/09/13</a:t>
             </a:fld>
             <a:endParaRPr lang="fr-FR"/>
           </a:p>
@@ -1319,7 +1320,7 @@
           <a:lstStyle/>
           <a:p>
             <a:fld id="{7B1C6575-2C33-C647-A206-42517C0356B4}" type="datetimeFigureOut">
-              <a:t>12/09/13</a:t>
+              <a:t>15/09/13</a:t>
             </a:fld>
             <a:endParaRPr lang="fr-FR"/>
           </a:p>
@@ -1736,7 +1737,7 @@
           <a:lstStyle/>
           <a:p>
             <a:fld id="{7B1C6575-2C33-C647-A206-42517C0356B4}" type="datetimeFigureOut">
-              <a:t>12/09/13</a:t>
+              <a:t>15/09/13</a:t>
             </a:fld>
             <a:endParaRPr lang="fr-FR"/>
           </a:p>
@@ -1851,7 +1852,7 @@
           <a:lstStyle/>
           <a:p>
             <a:fld id="{7B1C6575-2C33-C647-A206-42517C0356B4}" type="datetimeFigureOut">
-              <a:t>12/09/13</a:t>
+              <a:t>15/09/13</a:t>
             </a:fld>
             <a:endParaRPr lang="fr-FR"/>
           </a:p>
@@ -1944,7 +1945,7 @@
           <a:lstStyle/>
           <a:p>
             <a:fld id="{7B1C6575-2C33-C647-A206-42517C0356B4}" type="datetimeFigureOut">
-              <a:t>12/09/13</a:t>
+              <a:t>15/09/13</a:t>
             </a:fld>
             <a:endParaRPr lang="fr-FR"/>
           </a:p>
@@ -2217,7 +2218,7 @@
           <a:lstStyle/>
           <a:p>
             <a:fld id="{7B1C6575-2C33-C647-A206-42517C0356B4}" type="datetimeFigureOut">
-              <a:t>12/09/13</a:t>
+              <a:t>15/09/13</a:t>
             </a:fld>
             <a:endParaRPr lang="fr-FR"/>
           </a:p>
@@ -2467,7 +2468,7 @@
           <a:lstStyle/>
           <a:p>
             <a:fld id="{7B1C6575-2C33-C647-A206-42517C0356B4}" type="datetimeFigureOut">
-              <a:t>12/09/13</a:t>
+              <a:t>15/09/13</a:t>
             </a:fld>
             <a:endParaRPr lang="fr-FR"/>
           </a:p>
@@ -2676,7 +2677,7 @@
           </a:lstStyle>
           <a:p>
             <a:fld id="{7B1C6575-2C33-C647-A206-42517C0356B4}" type="datetimeFigureOut">
-              <a:t>12/09/13</a:t>
+              <a:t>15/09/13</a:t>
             </a:fld>
             <a:endParaRPr lang="fr-FR"/>
           </a:p>
@@ -4182,6 +4183,482 @@
     <p:extLst>
       <p:ext uri="{BB962C8B-B14F-4D97-AF65-F5344CB8AC3E}">
         <p14:creationId xmlns:p14="http://schemas.microsoft.com/office/powerpoint/2010/main" val="1718263158"/>
+      </p:ext>
+    </p:extLst>
+  </p:cSld>
+  <p:clrMapOvr>
+    <a:masterClrMapping/>
+  </p:clrMapOvr>
+</p:sld>
+</file>
+
+<file path=ppt/slides/slide2.xml><?xml version="1.0" encoding="utf-8"?>
+<p:sld xmlns:a="http://schemas.openxmlformats.org/drawingml/2006/main" xmlns:r="http://schemas.openxmlformats.org/officeDocument/2006/relationships" xmlns:p="http://schemas.openxmlformats.org/presentationml/2006/main">
+  <p:cSld>
+    <p:spTree>
+      <p:nvGrpSpPr>
+        <p:cNvPr id="1" name=""/>
+        <p:cNvGrpSpPr/>
+        <p:nvPr/>
+      </p:nvGrpSpPr>
+      <p:grpSpPr>
+        <a:xfrm>
+          <a:off x="0" y="0"/>
+          <a:ext cx="0" cy="0"/>
+          <a:chOff x="0" y="0"/>
+          <a:chExt cx="0" cy="0"/>
+        </a:xfrm>
+      </p:grpSpPr>
+      <p:sp>
+        <p:nvSpPr>
+          <p:cNvPr id="6" name="Rectangle 5"/>
+          <p:cNvSpPr/>
+          <p:nvPr/>
+        </p:nvSpPr>
+        <p:spPr>
+          <a:xfrm>
+            <a:off x="3046494" y="597833"/>
+            <a:ext cx="2028316" cy="2112670"/>
+          </a:xfrm>
+          <a:prstGeom prst="rect">
+            <a:avLst/>
+          </a:prstGeom>
+          <a:solidFill>
+            <a:schemeClr val="tx2">
+              <a:lumMod val="20000"/>
+              <a:lumOff val="80000"/>
+            </a:schemeClr>
+          </a:solidFill>
+          <a:ln>
+            <a:noFill/>
+          </a:ln>
+        </p:spPr>
+        <p:style>
+          <a:lnRef idx="1">
+            <a:schemeClr val="accent1"/>
+          </a:lnRef>
+          <a:fillRef idx="3">
+            <a:schemeClr val="accent1"/>
+          </a:fillRef>
+          <a:effectRef idx="2">
+            <a:schemeClr val="accent1"/>
+          </a:effectRef>
+          <a:fontRef idx="minor">
+            <a:schemeClr val="lt1"/>
+          </a:fontRef>
+        </p:style>
+        <p:txBody>
+          <a:bodyPr rtlCol="0" anchor="ctr"/>
+          <a:lstStyle/>
+          <a:p>
+            <a:pPr algn="ctr"/>
+            <a:endParaRPr lang="fr-FR"/>
+          </a:p>
+        </p:txBody>
+      </p:sp>
+      <p:sp>
+        <p:nvSpPr>
+          <p:cNvPr id="4" name="Rectangle 3"/>
+          <p:cNvSpPr/>
+          <p:nvPr/>
+        </p:nvSpPr>
+        <p:spPr>
+          <a:xfrm>
+            <a:off x="3273970" y="748706"/>
+            <a:ext cx="1582844" cy="1750190"/>
+          </a:xfrm>
+          <a:prstGeom prst="rect">
+            <a:avLst/>
+          </a:prstGeom>
+          <a:solidFill>
+            <a:schemeClr val="bg1"/>
+          </a:solidFill>
+        </p:spPr>
+        <p:style>
+          <a:lnRef idx="1">
+            <a:schemeClr val="accent1"/>
+          </a:lnRef>
+          <a:fillRef idx="3">
+            <a:schemeClr val="accent1"/>
+          </a:fillRef>
+          <a:effectRef idx="2">
+            <a:schemeClr val="accent1"/>
+          </a:effectRef>
+          <a:fontRef idx="minor">
+            <a:schemeClr val="lt1"/>
+          </a:fontRef>
+        </p:style>
+        <p:txBody>
+          <a:bodyPr rtlCol="0" anchor="ctr"/>
+          <a:lstStyle/>
+          <a:p>
+            <a:pPr algn="ctr"/>
+            <a:endParaRPr lang="fr-FR"/>
+          </a:p>
+        </p:txBody>
+      </p:sp>
+      <p:sp>
+        <p:nvSpPr>
+          <p:cNvPr id="5" name="Rectangle 4"/>
+          <p:cNvSpPr/>
+          <p:nvPr/>
+        </p:nvSpPr>
+        <p:spPr>
+          <a:xfrm>
+            <a:off x="3492716" y="1005353"/>
+            <a:ext cx="1136622" cy="1256791"/>
+          </a:xfrm>
+          <a:prstGeom prst="rect">
+            <a:avLst/>
+          </a:prstGeom>
+          <a:solidFill>
+            <a:schemeClr val="tx2">
+              <a:lumMod val="20000"/>
+              <a:lumOff val="80000"/>
+            </a:schemeClr>
+          </a:solidFill>
+        </p:spPr>
+        <p:style>
+          <a:lnRef idx="1">
+            <a:schemeClr val="accent1"/>
+          </a:lnRef>
+          <a:fillRef idx="3">
+            <a:schemeClr val="accent1"/>
+          </a:fillRef>
+          <a:effectRef idx="2">
+            <a:schemeClr val="accent1"/>
+          </a:effectRef>
+          <a:fontRef idx="minor">
+            <a:schemeClr val="lt1"/>
+          </a:fontRef>
+        </p:style>
+        <p:txBody>
+          <a:bodyPr rtlCol="0" anchor="ctr"/>
+          <a:lstStyle/>
+          <a:p>
+            <a:pPr algn="ctr"/>
+            <a:endParaRPr lang="fr-FR"/>
+          </a:p>
+        </p:txBody>
+      </p:sp>
+      <p:sp>
+        <p:nvSpPr>
+          <p:cNvPr id="7" name="Rectangle 6"/>
+          <p:cNvSpPr/>
+          <p:nvPr/>
+        </p:nvSpPr>
+        <p:spPr>
+          <a:xfrm>
+            <a:off x="5403267" y="579643"/>
+            <a:ext cx="2028316" cy="2112670"/>
+          </a:xfrm>
+          <a:prstGeom prst="rect">
+            <a:avLst/>
+          </a:prstGeom>
+          <a:solidFill>
+            <a:schemeClr val="accent2">
+              <a:lumMod val="75000"/>
+            </a:schemeClr>
+          </a:solidFill>
+          <a:ln>
+            <a:noFill/>
+          </a:ln>
+        </p:spPr>
+        <p:style>
+          <a:lnRef idx="1">
+            <a:schemeClr val="accent1"/>
+          </a:lnRef>
+          <a:fillRef idx="3">
+            <a:schemeClr val="accent1"/>
+          </a:fillRef>
+          <a:effectRef idx="2">
+            <a:schemeClr val="accent1"/>
+          </a:effectRef>
+          <a:fontRef idx="minor">
+            <a:schemeClr val="lt1"/>
+          </a:fontRef>
+        </p:style>
+        <p:txBody>
+          <a:bodyPr rtlCol="0" anchor="ctr"/>
+          <a:lstStyle/>
+          <a:p>
+            <a:pPr algn="ctr"/>
+            <a:endParaRPr lang="fr-FR"/>
+          </a:p>
+        </p:txBody>
+      </p:sp>
+      <p:sp>
+        <p:nvSpPr>
+          <p:cNvPr id="8" name="Rectangle 7"/>
+          <p:cNvSpPr/>
+          <p:nvPr/>
+        </p:nvSpPr>
+        <p:spPr>
+          <a:xfrm>
+            <a:off x="5630743" y="730516"/>
+            <a:ext cx="1582844" cy="1750190"/>
+          </a:xfrm>
+          <a:prstGeom prst="rect">
+            <a:avLst/>
+          </a:prstGeom>
+          <a:solidFill>
+            <a:schemeClr val="bg1"/>
+          </a:solidFill>
+        </p:spPr>
+        <p:style>
+          <a:lnRef idx="1">
+            <a:schemeClr val="accent1"/>
+          </a:lnRef>
+          <a:fillRef idx="3">
+            <a:schemeClr val="accent1"/>
+          </a:fillRef>
+          <a:effectRef idx="2">
+            <a:schemeClr val="accent1"/>
+          </a:effectRef>
+          <a:fontRef idx="minor">
+            <a:schemeClr val="lt1"/>
+          </a:fontRef>
+        </p:style>
+        <p:txBody>
+          <a:bodyPr rtlCol="0" anchor="ctr"/>
+          <a:lstStyle/>
+          <a:p>
+            <a:pPr algn="ctr"/>
+            <a:endParaRPr lang="fr-FR"/>
+          </a:p>
+        </p:txBody>
+      </p:sp>
+      <p:sp>
+        <p:nvSpPr>
+          <p:cNvPr id="9" name="Rectangle 8"/>
+          <p:cNvSpPr/>
+          <p:nvPr/>
+        </p:nvSpPr>
+        <p:spPr>
+          <a:xfrm>
+            <a:off x="5849489" y="987163"/>
+            <a:ext cx="1136622" cy="1256791"/>
+          </a:xfrm>
+          <a:prstGeom prst="rect">
+            <a:avLst/>
+          </a:prstGeom>
+          <a:solidFill>
+            <a:srgbClr val="953735"/>
+          </a:solidFill>
+        </p:spPr>
+        <p:style>
+          <a:lnRef idx="1">
+            <a:schemeClr val="accent1"/>
+          </a:lnRef>
+          <a:fillRef idx="3">
+            <a:schemeClr val="accent1"/>
+          </a:fillRef>
+          <a:effectRef idx="2">
+            <a:schemeClr val="accent1"/>
+          </a:effectRef>
+          <a:fontRef idx="minor">
+            <a:schemeClr val="lt1"/>
+          </a:fontRef>
+        </p:style>
+        <p:txBody>
+          <a:bodyPr rtlCol="0" anchor="ctr"/>
+          <a:lstStyle/>
+          <a:p>
+            <a:pPr algn="ctr"/>
+            <a:endParaRPr lang="fr-FR"/>
+          </a:p>
+        </p:txBody>
+      </p:sp>
+      <p:sp>
+        <p:nvSpPr>
+          <p:cNvPr id="11" name="ZoneTexte 10"/>
+          <p:cNvSpPr txBox="1"/>
+          <p:nvPr/>
+        </p:nvSpPr>
+        <p:spPr>
+          <a:xfrm>
+            <a:off x="4610254" y="672890"/>
+            <a:ext cx="312906" cy="369332"/>
+          </a:xfrm>
+          <a:prstGeom prst="rect">
+            <a:avLst/>
+          </a:prstGeom>
+          <a:noFill/>
+        </p:spPr>
+        <p:txBody>
+          <a:bodyPr wrap="none" rtlCol="0">
+            <a:spAutoFit/>
+          </a:bodyPr>
+          <a:lstStyle/>
+          <a:p>
+            <a:r>
+              <a:rPr lang="fr-FR"/>
+              <a:t>B</a:t>
+            </a:r>
+          </a:p>
+        </p:txBody>
+      </p:sp>
+      <p:sp>
+        <p:nvSpPr>
+          <p:cNvPr id="12" name="ZoneTexte 11"/>
+          <p:cNvSpPr txBox="1"/>
+          <p:nvPr/>
+        </p:nvSpPr>
+        <p:spPr>
+          <a:xfrm>
+            <a:off x="4311109" y="1005353"/>
+            <a:ext cx="318229" cy="369332"/>
+          </a:xfrm>
+          <a:prstGeom prst="rect">
+            <a:avLst/>
+          </a:prstGeom>
+          <a:noFill/>
+        </p:spPr>
+        <p:txBody>
+          <a:bodyPr wrap="none" rtlCol="0">
+            <a:spAutoFit/>
+          </a:bodyPr>
+          <a:lstStyle/>
+          <a:p>
+            <a:r>
+              <a:rPr lang="fr-FR"/>
+              <a:t>A</a:t>
+            </a:r>
+          </a:p>
+        </p:txBody>
+      </p:sp>
+      <p:sp>
+        <p:nvSpPr>
+          <p:cNvPr id="13" name="ZoneTexte 12"/>
+          <p:cNvSpPr txBox="1"/>
+          <p:nvPr/>
+        </p:nvSpPr>
+        <p:spPr>
+          <a:xfrm>
+            <a:off x="6667882" y="987163"/>
+            <a:ext cx="318229" cy="369332"/>
+          </a:xfrm>
+          <a:prstGeom prst="rect">
+            <a:avLst/>
+          </a:prstGeom>
+          <a:noFill/>
+        </p:spPr>
+        <p:txBody>
+          <a:bodyPr wrap="none" rtlCol="0">
+            <a:spAutoFit/>
+          </a:bodyPr>
+          <a:lstStyle/>
+          <a:p>
+            <a:r>
+              <a:rPr lang="fr-FR"/>
+              <a:t>A</a:t>
+            </a:r>
+          </a:p>
+        </p:txBody>
+      </p:sp>
+      <p:sp>
+        <p:nvSpPr>
+          <p:cNvPr id="14" name="ZoneTexte 13"/>
+          <p:cNvSpPr txBox="1"/>
+          <p:nvPr/>
+        </p:nvSpPr>
+        <p:spPr>
+          <a:xfrm>
+            <a:off x="6976505" y="635746"/>
+            <a:ext cx="312906" cy="369332"/>
+          </a:xfrm>
+          <a:prstGeom prst="rect">
+            <a:avLst/>
+          </a:prstGeom>
+          <a:noFill/>
+        </p:spPr>
+        <p:txBody>
+          <a:bodyPr wrap="none" rtlCol="0">
+            <a:spAutoFit/>
+          </a:bodyPr>
+          <a:lstStyle/>
+          <a:p>
+            <a:r>
+              <a:rPr lang="fr-FR"/>
+              <a:t>B</a:t>
+            </a:r>
+          </a:p>
+        </p:txBody>
+      </p:sp>
+      <p:sp>
+        <p:nvSpPr>
+          <p:cNvPr id="15" name="Rectangle 14"/>
+          <p:cNvSpPr/>
+          <p:nvPr/>
+        </p:nvSpPr>
+        <p:spPr>
+          <a:xfrm>
+            <a:off x="626310" y="749474"/>
+            <a:ext cx="1582844" cy="1750190"/>
+          </a:xfrm>
+          <a:prstGeom prst="rect">
+            <a:avLst/>
+          </a:prstGeom>
+          <a:solidFill>
+            <a:schemeClr val="bg1"/>
+          </a:solidFill>
+        </p:spPr>
+        <p:style>
+          <a:lnRef idx="1">
+            <a:schemeClr val="accent1"/>
+          </a:lnRef>
+          <a:fillRef idx="3">
+            <a:schemeClr val="accent1"/>
+          </a:fillRef>
+          <a:effectRef idx="2">
+            <a:schemeClr val="accent1"/>
+          </a:effectRef>
+          <a:fontRef idx="minor">
+            <a:schemeClr val="lt1"/>
+          </a:fontRef>
+        </p:style>
+        <p:txBody>
+          <a:bodyPr rtlCol="0" anchor="ctr"/>
+          <a:lstStyle/>
+          <a:p>
+            <a:pPr algn="ctr"/>
+            <a:endParaRPr lang="fr-FR"/>
+          </a:p>
+        </p:txBody>
+      </p:sp>
+      <p:sp>
+        <p:nvSpPr>
+          <p:cNvPr id="16" name="ZoneTexte 15"/>
+          <p:cNvSpPr txBox="1"/>
+          <p:nvPr/>
+        </p:nvSpPr>
+        <p:spPr>
+          <a:xfrm>
+            <a:off x="1962594" y="673658"/>
+            <a:ext cx="312906" cy="369332"/>
+          </a:xfrm>
+          <a:prstGeom prst="rect">
+            <a:avLst/>
+          </a:prstGeom>
+          <a:noFill/>
+        </p:spPr>
+        <p:txBody>
+          <a:bodyPr wrap="none" rtlCol="0">
+            <a:spAutoFit/>
+          </a:bodyPr>
+          <a:lstStyle/>
+          <a:p>
+            <a:r>
+              <a:rPr lang="fr-FR"/>
+              <a:t>B</a:t>
+            </a:r>
+          </a:p>
+        </p:txBody>
+      </p:sp>
+    </p:spTree>
+    <p:extLst>
+      <p:ext uri="{BB962C8B-B14F-4D97-AF65-F5344CB8AC3E}">
+        <p14:creationId xmlns:p14="http://schemas.microsoft.com/office/powerpoint/2010/main" val="3360089687"/>
       </p:ext>
     </p:extLst>
   </p:cSld>

</xml_diff>